<commit_message>
Rename and reset direction to cross-platform distributed actors
</commit_message>
<xml_diff>
--- a/docs/files/Fredis.pptx
+++ b/docs/files/Fredis.pptx
@@ -7442,12 +7442,18 @@
         </p:nvSpPr>
         <p:spPr/>
         <p:txBody>
-          <a:bodyPr/>
+          <a:bodyPr>
+            <a:normAutofit/>
+          </a:bodyPr>
           <a:lstStyle/>
           <a:p>
             <a:r>
+              <a:rPr lang="en-US" b="1" dirty="0"/>
+              <a:t>Pricing </a:t>
+            </a:r>
+            <a:r>
               <a:rPr lang="en-US" b="1" dirty="0" smtClean="0"/>
-              <a:t>Hello, Actors</a:t>
+              <a:t>matters</a:t>
             </a:r>
             <a:endParaRPr lang="en-US" b="1" dirty="0"/>
           </a:p>
@@ -7463,15 +7469,189 @@
             <p:ph idx="1"/>
           </p:nvPr>
         </p:nvSpPr>
-        <p:spPr/>
+        <p:spPr>
+          <a:xfrm>
+            <a:off x="457200" y="1219200"/>
+            <a:ext cx="8229600" cy="5486400"/>
+          </a:xfrm>
+        </p:spPr>
         <p:txBody>
-          <a:bodyPr/>
+          <a:bodyPr>
+            <a:normAutofit fontScale="77500" lnSpcReduction="20000"/>
+          </a:bodyPr>
           <a:lstStyle/>
           <a:p>
+            <a:r>
+              <a:rPr lang="en-US" dirty="0" smtClean="0"/>
+              <a:t>Fredis could run on </a:t>
+            </a:r>
+            <a:r>
+              <a:rPr lang="en-US" dirty="0" smtClean="0"/>
+              <a:t>Linux (Mono), </a:t>
+            </a:r>
+            <a:r>
+              <a:rPr lang="en-US" dirty="0" smtClean="0"/>
+              <a:t>but with </a:t>
+            </a:r>
+            <a:r>
+              <a:rPr lang="en-US" dirty="0" err="1" smtClean="0"/>
+              <a:t>dev</a:t>
+            </a:r>
+            <a:r>
+              <a:rPr lang="en-US" dirty="0" smtClean="0"/>
+              <a:t> + debug time accounted for – the </a:t>
+            </a:r>
+            <a:r>
+              <a:rPr lang="en-US" dirty="0" smtClean="0"/>
+              <a:t>Linux </a:t>
+            </a:r>
+            <a:r>
+              <a:rPr lang="en-US" dirty="0" smtClean="0"/>
+              <a:t>cost </a:t>
+            </a:r>
+            <a:r>
+              <a:rPr lang="en-US" dirty="0" smtClean="0"/>
+              <a:t>could exceed </a:t>
+            </a:r>
+            <a:r>
+              <a:rPr lang="en-US" dirty="0" smtClean="0"/>
+              <a:t>the cost of spot Windows servers:</a:t>
+            </a:r>
+          </a:p>
+          <a:p>
+            <a:pPr lvl="1"/>
+            <a:r>
+              <a:rPr lang="en-US" dirty="0" smtClean="0"/>
+              <a:t>Spot: </a:t>
+            </a:r>
+            <a:r>
+              <a:rPr lang="en-US" b="1" dirty="0" smtClean="0"/>
+              <a:t>0.072</a:t>
+            </a:r>
+          </a:p>
+          <a:p>
+            <a:pPr lvl="1"/>
+            <a:r>
+              <a:rPr lang="en-US" dirty="0" smtClean="0"/>
+              <a:t>Win </a:t>
+            </a:r>
+            <a:r>
+              <a:rPr lang="en-US" dirty="0"/>
+              <a:t>(OD): </a:t>
+            </a:r>
+            <a:r>
+              <a:rPr lang="en-US" dirty="0" smtClean="0"/>
+              <a:t>0.1337</a:t>
+            </a:r>
+          </a:p>
+          <a:p>
+            <a:pPr lvl="1"/>
+            <a:r>
+              <a:rPr lang="en-US" dirty="0" smtClean="0"/>
+              <a:t>Lin (OD): 0.077</a:t>
+            </a:r>
+          </a:p>
+          <a:p>
+            <a:pPr lvl="1"/>
+            <a:r>
+              <a:rPr lang="en-US" dirty="0" smtClean="0"/>
+              <a:t>Win (R): 0.069</a:t>
+            </a:r>
+          </a:p>
+          <a:p>
+            <a:pPr lvl="1"/>
+            <a:r>
+              <a:rPr lang="en-US" dirty="0" smtClean="0"/>
+              <a:t>Lin (R): </a:t>
+            </a:r>
+            <a:r>
+              <a:rPr lang="en-US" dirty="0" smtClean="0"/>
+              <a:t>0.03</a:t>
+            </a:r>
+          </a:p>
+          <a:p>
+            <a:pPr lvl="1"/>
+            <a:endParaRPr lang="en-US" dirty="0" smtClean="0"/>
+          </a:p>
+          <a:p>
+            <a:r>
+              <a:rPr lang="en-US" dirty="0" smtClean="0"/>
+              <a:t>Spots were knocked out only in one AZ in 3 months in EU.</a:t>
+            </a:r>
+          </a:p>
+          <a:p>
+            <a:r>
+              <a:rPr lang="en-US" dirty="0" smtClean="0"/>
+              <a:t>$100 ~ 100 full days difference per one m3.med: if your pay is $100/H you should spend less than 3.5 hours per machine per year to justify migration to Mono. </a:t>
+            </a:r>
+          </a:p>
+          <a:p>
+            <a:r>
+              <a:rPr lang="en-US" dirty="0"/>
+              <a:t>I</a:t>
+            </a:r>
+            <a:r>
+              <a:rPr lang="en-US" dirty="0" smtClean="0"/>
+              <a:t>f you have 10 machines, a half week of work (35 hours) is justified but not more.</a:t>
+            </a:r>
             <a:endParaRPr lang="en-US" dirty="0"/>
           </a:p>
         </p:txBody>
       </p:sp>
+      <p:pic>
+        <p:nvPicPr>
+          <p:cNvPr id="3075" name="Picture 3"/>
+          <p:cNvPicPr>
+            <a:picLocks noChangeAspect="1" noChangeArrowheads="1"/>
+          </p:cNvPicPr>
+          <p:nvPr/>
+        </p:nvPicPr>
+        <p:blipFill>
+          <a:blip r:embed="rId2">
+            <a:extLst>
+              <a:ext uri="{28A0092B-C50C-407E-A947-70E740481C1C}">
+                <a14:useLocalDpi xmlns:a14="http://schemas.microsoft.com/office/drawing/2010/main" val="0"/>
+              </a:ext>
+            </a:extLst>
+          </a:blip>
+          <a:srcRect/>
+          <a:stretch>
+            <a:fillRect/>
+          </a:stretch>
+        </p:blipFill>
+        <p:spPr bwMode="auto">
+          <a:xfrm>
+            <a:off x="4495800" y="1981200"/>
+            <a:ext cx="3810000" cy="2197422"/>
+          </a:xfrm>
+          <a:prstGeom prst="rect">
+            <a:avLst/>
+          </a:prstGeom>
+          <a:noFill/>
+          <a:ln>
+            <a:noFill/>
+          </a:ln>
+          <a:extLst>
+            <a:ext uri="{909E8E84-426E-40DD-AFC4-6F175D3DCCD1}">
+              <a14:hiddenFill xmlns:a14="http://schemas.microsoft.com/office/drawing/2010/main">
+                <a:solidFill>
+                  <a:schemeClr val="accent1"/>
+                </a:solidFill>
+              </a14:hiddenFill>
+            </a:ext>
+            <a:ext uri="{91240B29-F687-4F45-9708-019B960494DF}">
+              <a14:hiddenLine xmlns:a14="http://schemas.microsoft.com/office/drawing/2010/main" w="9525">
+                <a:solidFill>
+                  <a:schemeClr val="tx1"/>
+                </a:solidFill>
+                <a:miter lim="800000"/>
+                <a:headEnd/>
+                <a:tailEnd/>
+              </a14:hiddenLine>
+            </a:ext>
+          </a:extLst>
+        </p:spPr>
+      </p:pic>
     </p:spTree>
     <p:extLst>
       <p:ext uri="{BB962C8B-B14F-4D97-AF65-F5344CB8AC3E}">
@@ -8552,13 +8732,8 @@
             </a:r>
             <a:r>
               <a:rPr lang="en-US" sz="2400" dirty="0" smtClean="0"/>
-              <a:t>(AWS spot instances, commodity boxes</a:t>
-            </a:r>
-            <a:r>
-              <a:rPr lang="en-US" sz="2400" dirty="0" smtClean="0"/>
-              <a:t>) act upon shared data</a:t>
-            </a:r>
-            <a:endParaRPr lang="en-US" sz="2400" dirty="0" smtClean="0"/>
+              <a:t>(AWS spot instances, commodity boxes) act upon shared data</a:t>
+            </a:r>
           </a:p>
           <a:p>
             <a:r>
@@ -9905,11 +10080,7 @@
           <a:p>
             <a:r>
               <a:rPr lang="en-US" b="1" dirty="0" smtClean="0"/>
-              <a:t>Distributed </a:t>
-            </a:r>
-            <a:r>
-              <a:rPr lang="en-US" b="1" dirty="0" smtClean="0"/>
-              <a:t>Collections</a:t>
+              <a:t>Distributed Collections</a:t>
             </a:r>
             <a:endParaRPr lang="en-US" b="1" dirty="0"/>
           </a:p>
@@ -9944,7 +10115,6 @@
               <a:rPr lang="en-US" dirty="0" smtClean="0"/>
               <a:t>on L4/L5 in addition to strongly typed Redis collections.</a:t>
             </a:r>
-            <a:endParaRPr lang="en-US" dirty="0" smtClean="0"/>
           </a:p>
           <a:p>
             <a:r>
@@ -10007,7 +10177,6 @@
               <a:rPr lang="en-US" dirty="0" smtClean="0"/>
               <a:t>Locality = performance.</a:t>
             </a:r>
-            <a:endParaRPr lang="en-US" dirty="0" smtClean="0"/>
           </a:p>
         </p:txBody>
       </p:sp>
@@ -10088,23 +10257,11 @@
           <a:p>
             <a:r>
               <a:rPr lang="en-US" dirty="0" smtClean="0"/>
-              <a:t>A Fredis </a:t>
+              <a:t>Fredis </a:t>
             </a:r>
             <a:r>
               <a:rPr lang="en-US" dirty="0" smtClean="0"/>
-              <a:t>actors are </a:t>
-            </a:r>
-            <a:r>
-              <a:rPr lang="en-US" dirty="0" smtClean="0"/>
-              <a:t>abstract: </a:t>
-            </a:r>
-            <a:r>
-              <a:rPr lang="en-US" dirty="0" smtClean="0"/>
-              <a:t>they have </a:t>
-            </a:r>
-            <a:r>
-              <a:rPr lang="en-US" dirty="0" smtClean="0"/>
-              <a:t>a definition as a class and a number of instances running on worker nodes.</a:t>
+              <a:t>actors are abstract: they have a definition as a class and a number of instances running on worker nodes.</a:t>
             </a:r>
           </a:p>
           <a:p>
@@ -10118,13 +10275,8 @@
             </a:r>
             <a:r>
               <a:rPr lang="en-US" dirty="0" smtClean="0"/>
-              <a:t> of an actor: messages are sent to an abstract identity of an actor and are picked up by random </a:t>
-            </a:r>
-            <a:r>
-              <a:rPr lang="en-US" dirty="0" smtClean="0"/>
-              <a:t>instances inside workers cluster.</a:t>
-            </a:r>
-            <a:endParaRPr lang="en-US" dirty="0" smtClean="0"/>
+              <a:t> of an actor: messages are sent to an abstract identity of an actor and are picked up by random instances inside workers cluster.</a:t>
+            </a:r>
           </a:p>
         </p:txBody>
       </p:sp>
@@ -10402,15 +10554,15 @@
           <a:p>
             <a:r>
               <a:rPr lang="en-US" dirty="0" smtClean="0"/>
-              <a:t>In rare case of continuator death, continuation will be replayed and it will pick available* results from its actors </a:t>
-            </a:r>
-            <a:r>
-              <a:rPr lang="en-US" smtClean="0"/>
-              <a:t>without replay</a:t>
+              <a:t>In </a:t>
             </a:r>
             <a:r>
               <a:rPr lang="en-US" dirty="0" smtClean="0"/>
-              <a:t>.</a:t>
+              <a:t>a rare </a:t>
+            </a:r>
+            <a:r>
+              <a:rPr lang="en-US" dirty="0" smtClean="0"/>
+              <a:t>case of continuator death, continuation will be replayed and it will pick available* results from its actors without replay.</a:t>
             </a:r>
           </a:p>
           <a:p>

</xml_diff>